<commit_message>
Working version of reconnection
</commit_message>
<xml_diff>
--- a/Ethernet_Pr.pptx
+++ b/Ethernet_Pr.pptx
@@ -26,9 +26,12 @@
     <p:sldId id="271" r:id="rId20"/>
     <p:sldId id="272" r:id="rId21"/>
     <p:sldId id="268" r:id="rId22"/>
-    <p:sldId id="275" r:id="rId23"/>
-    <p:sldId id="277" r:id="rId24"/>
-    <p:sldId id="276" r:id="rId25"/>
+    <p:sldId id="281" r:id="rId23"/>
+    <p:sldId id="282" r:id="rId24"/>
+    <p:sldId id="275" r:id="rId25"/>
+    <p:sldId id="276" r:id="rId26"/>
+    <p:sldId id="283" r:id="rId27"/>
+    <p:sldId id="277" r:id="rId28"/>
   </p:sldIdLst>
   <p:sldSz cx="9144000" cy="6858000" type="screen4x3"/>
   <p:notesSz cx="6858000" cy="9144000"/>
@@ -756,7 +759,7 @@
             <a:fld id="{66221E02-25CB-4963-84BC-0813985E7D90}" type="datetimeFigureOut">
               <a:rPr lang="pl-PL" smtClean="0"/>
               <a:pPr/>
-              <a:t>01.02.2023</a:t>
+              <a:t>08.02.2023</a:t>
             </a:fld>
             <a:endParaRPr lang="pl-PL"/>
           </a:p>
@@ -954,7 +957,7 @@
             <a:fld id="{66221E02-25CB-4963-84BC-0813985E7D90}" type="datetimeFigureOut">
               <a:rPr lang="pl-PL" smtClean="0"/>
               <a:pPr/>
-              <a:t>01.02.2023</a:t>
+              <a:t>08.02.2023</a:t>
             </a:fld>
             <a:endParaRPr lang="pl-PL"/>
           </a:p>
@@ -1141,7 +1144,7 @@
             <a:fld id="{66221E02-25CB-4963-84BC-0813985E7D90}" type="datetimeFigureOut">
               <a:rPr lang="pl-PL" smtClean="0"/>
               <a:pPr/>
-              <a:t>01.02.2023</a:t>
+              <a:t>08.02.2023</a:t>
             </a:fld>
             <a:endParaRPr lang="pl-PL"/>
           </a:p>
@@ -1293,7 +1296,7 @@
             <a:fld id="{66221E02-25CB-4963-84BC-0813985E7D90}" type="datetimeFigureOut">
               <a:rPr lang="pl-PL" smtClean="0"/>
               <a:pPr/>
-              <a:t>01.02.2023</a:t>
+              <a:t>08.02.2023</a:t>
             </a:fld>
             <a:endParaRPr lang="pl-PL"/>
           </a:p>
@@ -1550,7 +1553,7 @@
             <a:fld id="{66221E02-25CB-4963-84BC-0813985E7D90}" type="datetimeFigureOut">
               <a:rPr lang="pl-PL" smtClean="0"/>
               <a:pPr/>
-              <a:t>01.02.2023</a:t>
+              <a:t>08.02.2023</a:t>
             </a:fld>
             <a:endParaRPr lang="pl-PL"/>
           </a:p>
@@ -1961,7 +1964,7 @@
             <a:fld id="{66221E02-25CB-4963-84BC-0813985E7D90}" type="datetimeFigureOut">
               <a:rPr lang="pl-PL" smtClean="0"/>
               <a:pPr/>
-              <a:t>01.02.2023</a:t>
+              <a:t>08.02.2023</a:t>
             </a:fld>
             <a:endParaRPr lang="pl-PL"/>
           </a:p>
@@ -2409,7 +2412,7 @@
             <a:fld id="{66221E02-25CB-4963-84BC-0813985E7D90}" type="datetimeFigureOut">
               <a:rPr lang="pl-PL" smtClean="0"/>
               <a:pPr/>
-              <a:t>01.02.2023</a:t>
+              <a:t>08.02.2023</a:t>
             </a:fld>
             <a:endParaRPr lang="pl-PL"/>
           </a:p>
@@ -2512,7 +2515,7 @@
             <a:fld id="{66221E02-25CB-4963-84BC-0813985E7D90}" type="datetimeFigureOut">
               <a:rPr lang="pl-PL" smtClean="0"/>
               <a:pPr/>
-              <a:t>01.02.2023</a:t>
+              <a:t>08.02.2023</a:t>
             </a:fld>
             <a:endParaRPr lang="pl-PL"/>
           </a:p>
@@ -2635,7 +2638,7 @@
             <a:fld id="{66221E02-25CB-4963-84BC-0813985E7D90}" type="datetimeFigureOut">
               <a:rPr lang="pl-PL" smtClean="0"/>
               <a:pPr/>
-              <a:t>01.02.2023</a:t>
+              <a:t>08.02.2023</a:t>
             </a:fld>
             <a:endParaRPr lang="pl-PL"/>
           </a:p>
@@ -2911,7 +2914,7 @@
             <a:fld id="{66221E02-25CB-4963-84BC-0813985E7D90}" type="datetimeFigureOut">
               <a:rPr lang="pl-PL" smtClean="0"/>
               <a:pPr/>
-              <a:t>01.02.2023</a:t>
+              <a:t>08.02.2023</a:t>
             </a:fld>
             <a:endParaRPr lang="pl-PL"/>
           </a:p>
@@ -3118,7 +3121,7 @@
             <a:fld id="{66221E02-25CB-4963-84BC-0813985E7D90}" type="datetimeFigureOut">
               <a:rPr lang="pl-PL" smtClean="0"/>
               <a:pPr/>
-              <a:t>01.02.2023</a:t>
+              <a:t>08.02.2023</a:t>
             </a:fld>
             <a:endParaRPr lang="pl-PL"/>
           </a:p>
@@ -4229,7 +4232,7 @@
             <a:fld id="{66221E02-25CB-4963-84BC-0813985E7D90}" type="datetimeFigureOut">
               <a:rPr lang="pl-PL" smtClean="0"/>
               <a:pPr/>
-              <a:t>01.02.2023</a:t>
+              <a:t>08.02.2023</a:t>
             </a:fld>
             <a:endParaRPr lang="pl-PL"/>
           </a:p>
@@ -8222,7 +8225,7 @@
         </p:nvSpPr>
         <p:spPr>
           <a:xfrm>
-            <a:off x="4857752" y="6396335"/>
+            <a:off x="4857752" y="6143644"/>
             <a:ext cx="4143404" cy="461665"/>
           </a:xfrm>
           <a:prstGeom prst="rect">
@@ -8867,7 +8870,7 @@
           <a:p>
             <a:r>
               <a:rPr lang="pl-PL" sz="1600" dirty="0" smtClean="0"/>
-              <a:t>powszechnie stosowany otwarty stos TCP/IP, zaprojektowany dla systemów wbudowanych. </a:t>
+              <a:t>Powszechnie stosowany otwarty stos TCP/IP, zaprojektowany dla systemów wbudowanych. </a:t>
             </a:r>
             <a:r>
               <a:rPr lang="pl-PL" sz="1600" dirty="0" err="1" smtClean="0"/>
@@ -8883,11 +8886,11 @@
             </a:r>
             <a:r>
               <a:rPr lang="pl-PL" sz="1600" dirty="0" smtClean="0"/>
-              <a:t> w Szwedzkim Instytucie Informatyki i obecnie jest rozwijany i wspierany przez programistów z całego </a:t>
+              <a:t> w Szwedzkim Instytucie Informatyki i obecnie jest rozwijany i wspierany przez programistów z całego świata. </a:t>
             </a:r>
             <a:r>
               <a:rPr lang="pl-PL" sz="1600" dirty="0" err="1" smtClean="0"/>
-              <a:t>świata.lwIP</a:t>
+              <a:t>LwIP</a:t>
             </a:r>
             <a:r>
               <a:rPr lang="pl-PL" sz="1600" dirty="0" smtClean="0"/>
@@ -8948,73 +8951,6 @@
             <a:r>
               <a:rPr lang="pl-PL" sz="1600" dirty="0" smtClean="0"/>
               <a:t>.</a:t>
-            </a:r>
-          </a:p>
-          <a:p>
-            <a:endParaRPr lang="pl-PL" sz="1600" dirty="0" smtClean="0"/>
-          </a:p>
-          <a:p>
-            <a:pPr>
-              <a:buNone/>
-            </a:pPr>
-            <a:r>
-              <a:rPr lang="pl-PL" sz="1600" dirty="0" smtClean="0"/>
-              <a:t>Cechy stosu:</a:t>
-            </a:r>
-          </a:p>
-          <a:p>
-            <a:r>
-              <a:rPr lang="pl-PL" sz="1600" dirty="0" smtClean="0"/>
-              <a:t>IP (Internet </a:t>
-            </a:r>
-            <a:r>
-              <a:rPr lang="pl-PL" sz="1600" dirty="0" err="1" smtClean="0"/>
-              <a:t>protocol</a:t>
-            </a:r>
-            <a:r>
-              <a:rPr lang="pl-PL" sz="1600" dirty="0" smtClean="0"/>
-              <a:t>), w tym przekazywanie pakietów pomiędzy kilkoma interfejsami sieciowymi</a:t>
-            </a:r>
-          </a:p>
-          <a:p>
-            <a:r>
-              <a:rPr lang="pl-PL" sz="1600" dirty="0" smtClean="0"/>
-              <a:t>Protokół ICMP (</a:t>
-            </a:r>
-            <a:r>
-              <a:rPr lang="pl-PL" sz="1600" dirty="0" err="1" smtClean="0"/>
-              <a:t>ICMP</a:t>
-            </a:r>
-            <a:r>
-              <a:rPr lang="pl-PL" sz="1600" dirty="0" smtClean="0"/>
-              <a:t>) do utrzymania sieci i </a:t>
-            </a:r>
-            <a:r>
-              <a:rPr lang="pl-PL" sz="1600" dirty="0" err="1" smtClean="0"/>
-              <a:t>debugowania</a:t>
-            </a:r>
-            <a:endParaRPr lang="pl-PL" sz="1600" dirty="0" smtClean="0"/>
-          </a:p>
-          <a:p>
-            <a:r>
-              <a:rPr lang="pl-PL" sz="1600" dirty="0" smtClean="0"/>
-              <a:t>Protokół IGMP (ang. Internet Group Management </a:t>
-            </a:r>
-            <a:r>
-              <a:rPr lang="pl-PL" sz="1600" dirty="0" err="1" smtClean="0"/>
-              <a:t>Protocol</a:t>
-            </a:r>
-            <a:r>
-              <a:rPr lang="pl-PL" sz="1600" dirty="0" smtClean="0"/>
-              <a:t>) do zarządzania grupami </a:t>
-            </a:r>
-            <a:r>
-              <a:rPr lang="pl-PL" sz="1600" dirty="0" err="1" smtClean="0"/>
-              <a:t>multicastowymi</a:t>
-            </a:r>
-            <a:r>
-              <a:rPr lang="pl-PL" sz="1600" dirty="0" smtClean="0"/>
-              <a:t> w sieci</a:t>
             </a:r>
           </a:p>
           <a:p>
@@ -9029,44 +8965,41 @@
             </a:pPr>
             <a:r>
               <a:rPr lang="pl-PL" sz="1600" dirty="0" smtClean="0"/>
-              <a:t>Warstwa transportowa</a:t>
+              <a:t>Cechy stosu:</a:t>
             </a:r>
           </a:p>
           <a:p>
             <a:r>
               <a:rPr lang="pl-PL" sz="1600" dirty="0" smtClean="0"/>
-              <a:t>Protokół UDP (protokół pakietów użytkownika)</a:t>
-            </a:r>
-          </a:p>
-          <a:p>
+              <a:t>IP (Internet </a:t>
+            </a:r>
+            <a:r>
+              <a:rPr lang="pl-PL" sz="1600" dirty="0" err="1" smtClean="0"/>
+              <a:t>protocol</a:t>
+            </a:r>
             <a:r>
               <a:rPr lang="pl-PL" sz="1600" dirty="0" smtClean="0"/>
-              <a:t>Protokół TCP (ang. </a:t>
+              <a:t>), w tym przekazywanie pakietów pomiędzy kilkoma interfejsami sieciowymi</a:t>
+            </a:r>
+          </a:p>
+          <a:p>
+            <a:r>
+              <a:rPr lang="pl-PL" sz="1600" dirty="0" smtClean="0"/>
+              <a:t>Protokół ICMP (</a:t>
             </a:r>
             <a:r>
               <a:rPr lang="pl-PL" sz="1600" dirty="0" err="1" smtClean="0"/>
-              <a:t>Transmission</a:t>
+              <a:t>ICMP</a:t>
             </a:r>
             <a:r>
               <a:rPr lang="pl-PL" sz="1600" dirty="0" smtClean="0"/>
-              <a:t> </a:t>
+              <a:t>) do utrzymania sieci i </a:t>
             </a:r>
             <a:r>
               <a:rPr lang="pl-PL" sz="1600" dirty="0" err="1" smtClean="0"/>
-              <a:t>Control</a:t>
-            </a:r>
-            <a:r>
-              <a:rPr lang="pl-PL" sz="1600" dirty="0" smtClean="0"/>
-              <a:t> </a:t>
-            </a:r>
-            <a:r>
-              <a:rPr lang="pl-PL" sz="1600" dirty="0" err="1" smtClean="0"/>
-              <a:t>Protocol</a:t>
-            </a:r>
-            <a:r>
-              <a:rPr lang="pl-PL" sz="1600" dirty="0" smtClean="0"/>
-              <a:t>)</a:t>
-            </a:r>
+              <a:t>debugowania</a:t>
+            </a:r>
+            <a:endParaRPr lang="pl-PL" sz="1600" dirty="0" smtClean="0"/>
           </a:p>
           <a:p>
             <a:pPr>
@@ -9080,13 +9013,64 @@
             </a:pPr>
             <a:r>
               <a:rPr lang="pl-PL" sz="1600" dirty="0" smtClean="0"/>
+              <a:t>Warstwa transportowa</a:t>
+            </a:r>
+          </a:p>
+          <a:p>
+            <a:r>
+              <a:rPr lang="pl-PL" sz="1600" dirty="0" smtClean="0"/>
+              <a:t>Protokół UDP (protokół pakietów użytkownika)</a:t>
+            </a:r>
+          </a:p>
+          <a:p>
+            <a:r>
+              <a:rPr lang="pl-PL" sz="1600" dirty="0" smtClean="0"/>
+              <a:t>Protokół TCP (ang. </a:t>
+            </a:r>
+            <a:r>
+              <a:rPr lang="pl-PL" sz="1600" dirty="0" err="1" smtClean="0"/>
+              <a:t>Transmission</a:t>
+            </a:r>
+            <a:r>
+              <a:rPr lang="pl-PL" sz="1600" dirty="0" smtClean="0"/>
+              <a:t> </a:t>
+            </a:r>
+            <a:r>
+              <a:rPr lang="pl-PL" sz="1600" dirty="0" err="1" smtClean="0"/>
+              <a:t>Control</a:t>
+            </a:r>
+            <a:r>
+              <a:rPr lang="pl-PL" sz="1600" dirty="0" smtClean="0"/>
+              <a:t> </a:t>
+            </a:r>
+            <a:r>
+              <a:rPr lang="pl-PL" sz="1600" dirty="0" err="1" smtClean="0"/>
+              <a:t>Protocol</a:t>
+            </a:r>
+            <a:r>
+              <a:rPr lang="pl-PL" sz="1600" dirty="0" smtClean="0"/>
+              <a:t>)</a:t>
+            </a:r>
+          </a:p>
+          <a:p>
+            <a:pPr>
+              <a:buNone/>
+            </a:pPr>
+            <a:endParaRPr lang="pl-PL" sz="1600" dirty="0" smtClean="0"/>
+          </a:p>
+          <a:p>
+            <a:pPr>
+              <a:buNone/>
+            </a:pPr>
+            <a:r>
+              <a:rPr lang="pl-PL" sz="1600" dirty="0" smtClean="0"/>
               <a:t>Warstwa aplikacji</a:t>
             </a:r>
           </a:p>
           <a:p>
             <a:r>
               <a:rPr lang="pl-PL" sz="1600" dirty="0" smtClean="0"/>
-              <a:t>DNS (system nazw domenowych)</a:t>
+              <a:t>HTTP(system nazw domenowych)</a:t>
             </a:r>
           </a:p>
           <a:p>
@@ -9108,6 +9092,18 @@
               <a:rPr lang="pl-PL" sz="1600" dirty="0" smtClean="0"/>
               <a:t>Protokół DHCP (protokół dynamicznego konfigurowania hostów)</a:t>
             </a:r>
+          </a:p>
+          <a:p>
+            <a:r>
+              <a:rPr lang="pl-PL" sz="1600" dirty="0" smtClean="0"/>
+              <a:t>MQQT</a:t>
+            </a:r>
+          </a:p>
+          <a:p>
+            <a:pPr>
+              <a:buNone/>
+            </a:pPr>
+            <a:endParaRPr lang="pl-PL" sz="1600" dirty="0" smtClean="0"/>
           </a:p>
           <a:p>
             <a:pPr>
@@ -9277,84 +9273,42 @@
             <p:ph idx="1"/>
           </p:nvPr>
         </p:nvSpPr>
-        <p:spPr>
-          <a:xfrm>
-            <a:off x="428596" y="1500174"/>
-            <a:ext cx="8229600" cy="4525963"/>
-          </a:xfrm>
-        </p:spPr>
+        <p:spPr/>
         <p:txBody>
           <a:bodyPr>
-            <a:normAutofit fontScale="92500" lnSpcReduction="20000"/>
+            <a:normAutofit/>
           </a:bodyPr>
           <a:lstStyle/>
           <a:p>
             <a:r>
-              <a:rPr lang="pl-PL" dirty="0" smtClean="0"/>
-              <a:t>Podczas implementacji będziemy bazować na sterowniku udostępnionym przez ST:</a:t>
-            </a:r>
-            <a:br>
-              <a:rPr lang="pl-PL" dirty="0" smtClean="0"/>
-            </a:br>
-            <a:r>
-              <a:rPr lang="pl-PL" dirty="0" smtClean="0"/>
-              <a:t> </a:t>
-            </a:r>
-            <a:r>
-              <a:rPr lang="pl-PL" dirty="0" smtClean="0">
-                <a:hlinkClick r:id="rId2"/>
-              </a:rPr>
-              <a:t>https://www.st.com/en/embedded-software/stsw-stm32070.html#get-software</a:t>
-            </a:r>
-            <a:r>
-              <a:rPr lang="pl-PL" dirty="0" smtClean="0"/>
-              <a:t> </a:t>
-            </a:r>
-            <a:br>
-              <a:rPr lang="pl-PL" dirty="0" smtClean="0"/>
-            </a:br>
-            <a:r>
-              <a:rPr lang="pl-PL" dirty="0" smtClean="0"/>
-              <a:t/>
-            </a:r>
-            <a:br>
-              <a:rPr lang="pl-PL" dirty="0" smtClean="0"/>
-            </a:br>
-            <a:r>
-              <a:rPr lang="pl-PL" dirty="0" smtClean="0"/>
-              <a:t>Jest to nieco starsza implementacja udostępniona jeszcze przed powstaniem biblioteki „HAL” </a:t>
-            </a:r>
-            <a:br>
-              <a:rPr lang="pl-PL" dirty="0" smtClean="0"/>
-            </a:br>
-            <a:r>
-              <a:rPr lang="pl-PL" dirty="0" smtClean="0"/>
-              <a:t/>
-            </a:r>
-            <a:br>
-              <a:rPr lang="pl-PL" dirty="0" smtClean="0"/>
-            </a:br>
-            <a:r>
-              <a:rPr lang="pl-PL" dirty="0" smtClean="0"/>
-              <a:t>Podobnie też w przypadku USB – uogólniając jak chcemy zrobić implementacje jakiegoś swojego sterownika, lub go dobrze poznać polecam się wzorować na tych starszych implementacjach od ST - biblioteki „SPL- Serial </a:t>
-            </a:r>
-            <a:r>
-              <a:rPr lang="pl-PL" dirty="0" err="1" smtClean="0"/>
-              <a:t>Peripherial</a:t>
-            </a:r>
-            <a:r>
-              <a:rPr lang="pl-PL" dirty="0" smtClean="0"/>
-              <a:t> </a:t>
-            </a:r>
-            <a:r>
-              <a:rPr lang="pl-PL" dirty="0" err="1" smtClean="0"/>
-              <a:t>Library</a:t>
-            </a:r>
-            <a:r>
-              <a:rPr lang="pl-PL" dirty="0" smtClean="0"/>
-              <a:t>”</a:t>
-            </a:r>
-            <a:endParaRPr lang="pl-PL" dirty="0"/>
+              <a:rPr lang="pl-PL" sz="1200" dirty="0" smtClean="0"/>
+              <a:t>Łańcuch może zawierać jeden lub wiele buforów. Koniec łańcucha można rozpoznać za pomocą składowych </a:t>
+            </a:r>
+            <a:r>
+              <a:rPr lang="pl-PL" sz="1200" dirty="0" err="1" smtClean="0"/>
+              <a:t>tot_len</a:t>
+            </a:r>
+            <a:r>
+              <a:rPr lang="pl-PL" sz="1200" dirty="0" smtClean="0"/>
+              <a:t> i len. Składowa len zawiera długość bufora. Składowa </a:t>
+            </a:r>
+            <a:r>
+              <a:rPr lang="pl-PL" sz="1200" dirty="0" err="1" smtClean="0"/>
+              <a:t>tot_len</a:t>
+            </a:r>
+            <a:r>
+              <a:rPr lang="pl-PL" sz="1200" dirty="0" smtClean="0"/>
+              <a:t> zawieracałkowitą długość pakietu, czyli sumę długości wszystkich buforów w łańcuchu. Ostatnia struktura w łańcuchu ma równe wartości tych składowych i jest to jedyny poprawny sposób rozpoznawania końca łańcucha buforów.</a:t>
+            </a:r>
+          </a:p>
+          <a:p>
+            <a:endParaRPr lang="pl-PL" sz="1200" dirty="0" smtClean="0"/>
+          </a:p>
+          <a:p>
+            <a:pPr>
+              <a:buNone/>
+            </a:pPr>
+            <a:endParaRPr lang="pl-PL" sz="1200" dirty="0" smtClean="0"/>
           </a:p>
         </p:txBody>
       </p:sp>
@@ -9375,9 +9329,81 @@
           <a:p>
             <a:r>
               <a:rPr lang="pl-PL" dirty="0" smtClean="0"/>
-              <a:t>Bazowy sterownik Ethernetu</a:t>
+              <a:t>Struktura </a:t>
+            </a:r>
+            <a:r>
+              <a:rPr lang="pl-PL" dirty="0" err="1" smtClean="0"/>
+              <a:t>pbuf</a:t>
             </a:r>
             <a:endParaRPr lang="pl-PL" dirty="0"/>
+          </a:p>
+        </p:txBody>
+      </p:sp>
+      <p:pic>
+        <p:nvPicPr>
+          <p:cNvPr id="6" name="Picture 2"/>
+          <p:cNvPicPr>
+            <a:picLocks noChangeAspect="1" noChangeArrowheads="1"/>
+          </p:cNvPicPr>
+          <p:nvPr/>
+        </p:nvPicPr>
+        <p:blipFill>
+          <a:blip r:embed="rId2"/>
+          <a:srcRect/>
+          <a:stretch>
+            <a:fillRect/>
+          </a:stretch>
+        </p:blipFill>
+        <p:spPr bwMode="auto">
+          <a:xfrm>
+            <a:off x="4000496" y="2428868"/>
+            <a:ext cx="4000528" cy="3493540"/>
+          </a:xfrm>
+          <a:prstGeom prst="rect">
+            <a:avLst/>
+          </a:prstGeom>
+          <a:noFill/>
+          <a:ln w="9525">
+            <a:noFill/>
+            <a:miter lim="800000"/>
+            <a:headEnd/>
+            <a:tailEnd/>
+          </a:ln>
+          <a:effectLst/>
+        </p:spPr>
+      </p:pic>
+      <p:sp>
+        <p:nvSpPr>
+          <p:cNvPr id="7" name="Prostokąt 6"/>
+          <p:cNvSpPr/>
+          <p:nvPr/>
+        </p:nvSpPr>
+        <p:spPr>
+          <a:xfrm>
+            <a:off x="142844" y="5500702"/>
+            <a:ext cx="4071934" cy="246221"/>
+          </a:xfrm>
+          <a:prstGeom prst="rect">
+            <a:avLst/>
+          </a:prstGeom>
+        </p:spPr>
+        <p:txBody>
+          <a:bodyPr wrap="square">
+            <a:spAutoFit/>
+          </a:bodyPr>
+          <a:lstStyle/>
+          <a:p>
+            <a:r>
+              <a:rPr lang="pl-PL" sz="1000" dirty="0" smtClean="0">
+                <a:hlinkClick r:id="rId3"/>
+              </a:rPr>
+              <a:t>https://www.artila.com/download/RIO/RIO-2010PG/lwip.pdf</a:t>
+            </a:r>
+            <a:r>
+              <a:rPr lang="pl-PL" sz="1000" dirty="0" smtClean="0"/>
+              <a:t> </a:t>
+            </a:r>
+            <a:endParaRPr lang="pl-PL" sz="1000" dirty="0"/>
           </a:p>
         </p:txBody>
       </p:sp>
@@ -9418,78 +9444,14 @@
         </p:nvSpPr>
         <p:spPr/>
         <p:txBody>
-          <a:bodyPr>
-            <a:normAutofit/>
-          </a:bodyPr>
+          <a:bodyPr/>
           <a:lstStyle/>
           <a:p>
             <a:r>
-              <a:rPr lang="pl-PL" sz="1200" dirty="0" smtClean="0"/>
-              <a:t>1. Mikrokontrolery STM32 w sieci Ethernet w przykładach - Marcin </a:t>
-            </a:r>
-            <a:r>
-              <a:rPr lang="pl-PL" sz="1200" dirty="0" err="1" smtClean="0"/>
-              <a:t>Peczarski</a:t>
-            </a:r>
-            <a:r>
-              <a:rPr lang="pl-PL" sz="1200" dirty="0" smtClean="0"/>
-              <a:t>, do zakupienia np. tutaj: </a:t>
-            </a:r>
-            <a:br>
-              <a:rPr lang="pl-PL" sz="1200" dirty="0" smtClean="0"/>
-            </a:br>
-            <a:r>
-              <a:rPr lang="pl-PL" sz="1200" dirty="0" smtClean="0">
-                <a:hlinkClick r:id="rId2"/>
-              </a:rPr>
-              <a:t>https://botland.com.pl/ksiazki-i-kursy/3411-mikrokontrolery-stm32-w-sieci-ethernet-w-przykladach-marcin-peczarski-9788360233689.html</a:t>
-            </a:r>
-            <a:r>
-              <a:rPr lang="pl-PL" sz="1200" dirty="0" smtClean="0"/>
-              <a:t> </a:t>
-            </a:r>
-          </a:p>
-          <a:p>
-            <a:pPr>
-              <a:buNone/>
-            </a:pPr>
-            <a:endParaRPr lang="pl-PL" sz="1200" dirty="0" smtClean="0"/>
-          </a:p>
-          <a:p>
-            <a:r>
-              <a:rPr lang="pl-PL" sz="1200" dirty="0" smtClean="0"/>
-              <a:t>2. Lokalne sieci komputerowe, Tomasz </a:t>
-            </a:r>
-            <a:r>
-              <a:rPr lang="pl-PL" sz="1200" dirty="0" err="1" smtClean="0"/>
-              <a:t>Fitzermann</a:t>
-            </a:r>
-            <a:r>
-              <a:rPr lang="pl-PL" sz="1200" dirty="0" smtClean="0"/>
-              <a:t> </a:t>
-            </a:r>
-            <a:br>
-              <a:rPr lang="pl-PL" sz="1200" dirty="0" smtClean="0"/>
-            </a:br>
-            <a:r>
-              <a:rPr lang="pl-PL" sz="1200" dirty="0" smtClean="0">
-                <a:hlinkClick r:id="rId3"/>
-              </a:rPr>
-              <a:t>http://www.sosw.poznan.pl/tfitzer/sieci/sieci.pdf</a:t>
-            </a:r>
-            <a:r>
-              <a:rPr lang="pl-PL" sz="1200" dirty="0" smtClean="0"/>
-              <a:t>  [dostęp 28.01.2023]</a:t>
-            </a:r>
-          </a:p>
-          <a:p>
-            <a:endParaRPr lang="pl-PL" sz="1200" dirty="0" smtClean="0"/>
-          </a:p>
-          <a:p>
-            <a:pPr>
-              <a:buNone/>
-            </a:pPr>
-            <a:endParaRPr lang="pl-PL" sz="1200" dirty="0"/>
+              <a:rPr lang="pl-PL" dirty="0" smtClean="0"/>
+              <a:t>Służy do opisania naszego interfejsu i jego parametrów wewnątrz biblioteki</a:t>
+            </a:r>
+            <a:endParaRPr lang="pl-PL" dirty="0"/>
           </a:p>
         </p:txBody>
       </p:sp>
@@ -9505,19 +9467,54 @@
         </p:nvSpPr>
         <p:spPr/>
         <p:txBody>
-          <a:bodyPr>
-            <a:normAutofit/>
-          </a:bodyPr>
+          <a:bodyPr/>
           <a:lstStyle/>
           <a:p>
             <a:r>
               <a:rPr lang="pl-PL" dirty="0" smtClean="0"/>
-              <a:t>Polecana literatura:		</a:t>
+              <a:t>Struktura </a:t>
+            </a:r>
+            <a:r>
+              <a:rPr lang="pl-PL" dirty="0" err="1" smtClean="0"/>
+              <a:t>netif</a:t>
             </a:r>
             <a:endParaRPr lang="pl-PL" dirty="0"/>
           </a:p>
         </p:txBody>
       </p:sp>
+      <p:pic>
+        <p:nvPicPr>
+          <p:cNvPr id="2051" name="Picture 3"/>
+          <p:cNvPicPr>
+            <a:picLocks noChangeAspect="1" noChangeArrowheads="1"/>
+          </p:cNvPicPr>
+          <p:nvPr/>
+        </p:nvPicPr>
+        <p:blipFill>
+          <a:blip r:embed="rId2"/>
+          <a:srcRect/>
+          <a:stretch>
+            <a:fillRect/>
+          </a:stretch>
+        </p:blipFill>
+        <p:spPr bwMode="auto">
+          <a:xfrm>
+            <a:off x="571472" y="3071810"/>
+            <a:ext cx="6683359" cy="2625648"/>
+          </a:xfrm>
+          <a:prstGeom prst="rect">
+            <a:avLst/>
+          </a:prstGeom>
+          <a:noFill/>
+          <a:ln w="9525">
+            <a:noFill/>
+            <a:miter lim="800000"/>
+            <a:headEnd/>
+            <a:tailEnd/>
+          </a:ln>
+          <a:effectLst/>
+        </p:spPr>
+      </p:pic>
     </p:spTree>
   </p:cSld>
   <p:clrMapOvr>
@@ -9555,29 +9552,80 @@
         </p:nvSpPr>
         <p:spPr>
           <a:xfrm>
-            <a:off x="457200" y="1481329"/>
-            <a:ext cx="8229600" cy="2590614"/>
+            <a:off x="428596" y="1500174"/>
+            <a:ext cx="8229600" cy="4525963"/>
           </a:xfrm>
         </p:spPr>
         <p:txBody>
-          <a:bodyPr/>
+          <a:bodyPr>
+            <a:normAutofit fontScale="92500" lnSpcReduction="20000"/>
+          </a:bodyPr>
           <a:lstStyle/>
           <a:p>
             <a:r>
               <a:rPr lang="pl-PL" dirty="0" smtClean="0"/>
-              <a:t>1. Poznajmy implementacje sterownika </a:t>
-            </a:r>
-          </a:p>
-          <a:p>
-            <a:r>
+              <a:t>Podczas implementacji będziemy bazować na sterowniku udostępnionym przez ST:</a:t>
+            </a:r>
+            <a:br>
               <a:rPr lang="pl-PL" dirty="0" smtClean="0"/>
-              <a:t>2. Z integrujmy bibliotekę LWiP </a:t>
-            </a:r>
-          </a:p>
-          <a:p>
+            </a:br>
             <a:r>
               <a:rPr lang="pl-PL" dirty="0" smtClean="0"/>
-              <a:t>3. Uruchommy prostą stronę internetową korzystając z biblioteki LWiP</a:t>
+              <a:t> </a:t>
+            </a:r>
+            <a:r>
+              <a:rPr lang="pl-PL" dirty="0" smtClean="0">
+                <a:hlinkClick r:id="rId2"/>
+              </a:rPr>
+              <a:t>https://www.st.com/en/embedded-software/stsw-stm32070.html#get-software</a:t>
+            </a:r>
+            <a:r>
+              <a:rPr lang="pl-PL" dirty="0" smtClean="0"/>
+              <a:t> </a:t>
+            </a:r>
+            <a:br>
+              <a:rPr lang="pl-PL" dirty="0" smtClean="0"/>
+            </a:br>
+            <a:r>
+              <a:rPr lang="pl-PL" dirty="0" smtClean="0"/>
+              <a:t/>
+            </a:r>
+            <a:br>
+              <a:rPr lang="pl-PL" dirty="0" smtClean="0"/>
+            </a:br>
+            <a:r>
+              <a:rPr lang="pl-PL" dirty="0" smtClean="0"/>
+              <a:t>Jest to nieco starsza implementacja udostępniona jeszcze przed powstaniem biblioteki „HAL” </a:t>
+            </a:r>
+            <a:br>
+              <a:rPr lang="pl-PL" dirty="0" smtClean="0"/>
+            </a:br>
+            <a:r>
+              <a:rPr lang="pl-PL" dirty="0" smtClean="0"/>
+              <a:t/>
+            </a:r>
+            <a:br>
+              <a:rPr lang="pl-PL" dirty="0" smtClean="0"/>
+            </a:br>
+            <a:r>
+              <a:rPr lang="pl-PL" dirty="0" smtClean="0"/>
+              <a:t>Podobnie też w przypadku USB – uogólniając jak chcemy zrobić implementacje jakiegoś swojego sterownika, lub go dobrze poznać polecam się wzorować na tych starszych implementacjach od ST - biblioteki „SPL- Serial </a:t>
+            </a:r>
+            <a:r>
+              <a:rPr lang="pl-PL" dirty="0" err="1" smtClean="0"/>
+              <a:t>Peripherial</a:t>
+            </a:r>
+            <a:r>
+              <a:rPr lang="pl-PL" dirty="0" smtClean="0"/>
+              <a:t> </a:t>
+            </a:r>
+            <a:r>
+              <a:rPr lang="pl-PL" dirty="0" err="1" smtClean="0"/>
+              <a:t>Library</a:t>
+            </a:r>
+            <a:r>
+              <a:rPr lang="pl-PL" dirty="0" smtClean="0"/>
+              <a:t>”</a:t>
             </a:r>
             <a:endParaRPr lang="pl-PL" dirty="0"/>
           </a:p>
@@ -9600,7 +9648,372 @@
           <a:p>
             <a:r>
               <a:rPr lang="pl-PL" dirty="0" smtClean="0"/>
+              <a:t>Bazowy sterownik Ethernetu</a:t>
+            </a:r>
+            <a:endParaRPr lang="pl-PL" dirty="0"/>
+          </a:p>
+        </p:txBody>
+      </p:sp>
+    </p:spTree>
+  </p:cSld>
+  <p:clrMapOvr>
+    <a:masterClrMapping/>
+  </p:clrMapOvr>
+</p:sld>
+</file>
+
+<file path=ppt/slides/slide25.xml><?xml version="1.0" encoding="utf-8"?>
+<p:sld xmlns:a="http://schemas.openxmlformats.org/drawingml/2006/main" xmlns:r="http://schemas.openxmlformats.org/officeDocument/2006/relationships" xmlns:p="http://schemas.openxmlformats.org/presentationml/2006/main">
+  <p:cSld>
+    <p:spTree>
+      <p:nvGrpSpPr>
+        <p:cNvPr id="1" name=""/>
+        <p:cNvGrpSpPr/>
+        <p:nvPr/>
+      </p:nvGrpSpPr>
+      <p:grpSpPr>
+        <a:xfrm>
+          <a:off x="0" y="0"/>
+          <a:ext cx="0" cy="0"/>
+          <a:chOff x="0" y="0"/>
+          <a:chExt cx="0" cy="0"/>
+        </a:xfrm>
+      </p:grpSpPr>
+      <p:sp>
+        <p:nvSpPr>
+          <p:cNvPr id="2" name="Symbol zastępczy zawartości 1"/>
+          <p:cNvSpPr>
+            <a:spLocks noGrp="1"/>
+          </p:cNvSpPr>
+          <p:nvPr>
+            <p:ph idx="1"/>
+          </p:nvPr>
+        </p:nvSpPr>
+        <p:spPr>
+          <a:xfrm>
+            <a:off x="457200" y="1481329"/>
+            <a:ext cx="8229600" cy="2590614"/>
+          </a:xfrm>
+        </p:spPr>
+        <p:txBody>
+          <a:bodyPr/>
+          <a:lstStyle/>
+          <a:p>
+            <a:r>
+              <a:rPr lang="pl-PL" dirty="0" smtClean="0"/>
+              <a:t>1. Poznajmy implementacje sterownika </a:t>
+            </a:r>
+          </a:p>
+          <a:p>
+            <a:r>
+              <a:rPr lang="pl-PL" dirty="0" smtClean="0"/>
+              <a:t>2. Z integrujmy bibliotekę LWiP </a:t>
+            </a:r>
+          </a:p>
+          <a:p>
+            <a:r>
+              <a:rPr lang="pl-PL" dirty="0" smtClean="0"/>
+              <a:t>3. Uruchommy prostą stronę internetową korzystając z biblioteki LWiP</a:t>
+            </a:r>
+            <a:endParaRPr lang="pl-PL" dirty="0"/>
+          </a:p>
+        </p:txBody>
+      </p:sp>
+      <p:sp>
+        <p:nvSpPr>
+          <p:cNvPr id="3" name="Tytuł 2"/>
+          <p:cNvSpPr>
+            <a:spLocks noGrp="1"/>
+          </p:cNvSpPr>
+          <p:nvPr>
+            <p:ph type="title"/>
+          </p:nvPr>
+        </p:nvSpPr>
+        <p:spPr/>
+        <p:txBody>
+          <a:bodyPr/>
+          <a:lstStyle/>
+          <a:p>
+            <a:r>
+              <a:rPr lang="pl-PL" dirty="0" smtClean="0"/>
               <a:t>Do Kodu!</a:t>
+            </a:r>
+            <a:endParaRPr lang="pl-PL" dirty="0"/>
+          </a:p>
+        </p:txBody>
+      </p:sp>
+    </p:spTree>
+  </p:cSld>
+  <p:clrMapOvr>
+    <a:masterClrMapping/>
+  </p:clrMapOvr>
+</p:sld>
+</file>
+
+<file path=ppt/slides/slide26.xml><?xml version="1.0" encoding="utf-8"?>
+<p:sld xmlns:a="http://schemas.openxmlformats.org/drawingml/2006/main" xmlns:r="http://schemas.openxmlformats.org/officeDocument/2006/relationships" xmlns:p="http://schemas.openxmlformats.org/presentationml/2006/main">
+  <p:cSld>
+    <p:spTree>
+      <p:nvGrpSpPr>
+        <p:cNvPr id="1" name=""/>
+        <p:cNvGrpSpPr/>
+        <p:nvPr/>
+      </p:nvGrpSpPr>
+      <p:grpSpPr>
+        <a:xfrm>
+          <a:off x="0" y="0"/>
+          <a:ext cx="0" cy="0"/>
+          <a:chOff x="0" y="0"/>
+          <a:chExt cx="0" cy="0"/>
+        </a:xfrm>
+      </p:grpSpPr>
+      <p:sp>
+        <p:nvSpPr>
+          <p:cNvPr id="2" name="Symbol zastępczy zawartości 1"/>
+          <p:cNvSpPr>
+            <a:spLocks noGrp="1"/>
+          </p:cNvSpPr>
+          <p:nvPr>
+            <p:ph idx="1"/>
+          </p:nvPr>
+        </p:nvSpPr>
+        <p:spPr/>
+        <p:txBody>
+          <a:bodyPr>
+            <a:normAutofit fontScale="92500" lnSpcReduction="10000"/>
+          </a:bodyPr>
+          <a:lstStyle/>
+          <a:p>
+            <a:pPr>
+              <a:buNone/>
+            </a:pPr>
+            <a:r>
+              <a:rPr lang="pl-PL" dirty="0" smtClean="0"/>
+              <a:t>W trakcie tego video:</a:t>
+            </a:r>
+          </a:p>
+          <a:p>
+            <a:r>
+              <a:rPr lang="pl-PL" dirty="0" smtClean="0"/>
+              <a:t>Zapoznano się z podstawami </a:t>
+            </a:r>
+            <a:r>
+              <a:rPr lang="pl-PL" dirty="0" err="1" smtClean="0"/>
+              <a:t>internetu</a:t>
+            </a:r>
+            <a:endParaRPr lang="pl-PL" dirty="0" smtClean="0"/>
+          </a:p>
+          <a:p>
+            <a:r>
+              <a:rPr lang="pl-PL" dirty="0" smtClean="0"/>
+              <a:t>Poznano wybrane </a:t>
+            </a:r>
+            <a:r>
+              <a:rPr lang="pl-PL" dirty="0" err="1" smtClean="0"/>
+              <a:t>framenty</a:t>
+            </a:r>
+            <a:r>
+              <a:rPr lang="pl-PL" dirty="0" smtClean="0"/>
+              <a:t> </a:t>
+            </a:r>
+            <a:r>
+              <a:rPr lang="pl-PL" dirty="0" err="1" smtClean="0"/>
+              <a:t>bibliteki</a:t>
+            </a:r>
+            <a:r>
+              <a:rPr lang="pl-PL" dirty="0" smtClean="0"/>
+              <a:t> LWiP</a:t>
+            </a:r>
+          </a:p>
+          <a:p>
+            <a:r>
+              <a:rPr lang="pl-PL" dirty="0" smtClean="0"/>
+              <a:t>Przeanalizowano i zaimplementowano  sterownik Ethernetu dla płyty Nucleo-STM32F767. Bazując na przykładzie SPL od ST dla płyt z serii F4</a:t>
+            </a:r>
+          </a:p>
+          <a:p>
+            <a:r>
+              <a:rPr lang="pl-PL" dirty="0" smtClean="0"/>
+              <a:t>Przybliżono rozdział w dokumentacji mikrokontrolera STM32F767 dotyczący </a:t>
+            </a:r>
+            <a:r>
+              <a:rPr lang="pl-PL" dirty="0" err="1" smtClean="0"/>
+              <a:t>ethernetu</a:t>
+            </a:r>
+            <a:endParaRPr lang="pl-PL" dirty="0" smtClean="0"/>
+          </a:p>
+          <a:p>
+            <a:r>
+              <a:rPr lang="pl-PL" dirty="0" smtClean="0"/>
+              <a:t>Uruchomiono prostą stronę internetową z możliwością sterowania diodami oraz sprawdzenia ich stanu</a:t>
+            </a:r>
+          </a:p>
+          <a:p>
+            <a:endParaRPr lang="pl-PL" dirty="0" smtClean="0"/>
+          </a:p>
+          <a:p>
+            <a:pPr>
+              <a:buNone/>
+            </a:pPr>
+            <a:endParaRPr lang="pl-PL" dirty="0"/>
+          </a:p>
+        </p:txBody>
+      </p:sp>
+      <p:sp>
+        <p:nvSpPr>
+          <p:cNvPr id="3" name="Tytuł 2"/>
+          <p:cNvSpPr>
+            <a:spLocks noGrp="1"/>
+          </p:cNvSpPr>
+          <p:nvPr>
+            <p:ph type="title"/>
+          </p:nvPr>
+        </p:nvSpPr>
+        <p:spPr/>
+        <p:txBody>
+          <a:bodyPr/>
+          <a:lstStyle/>
+          <a:p>
+            <a:r>
+              <a:rPr lang="pl-PL" dirty="0" smtClean="0"/>
+              <a:t>Podsumowanie	</a:t>
+            </a:r>
+            <a:endParaRPr lang="pl-PL" dirty="0"/>
+          </a:p>
+        </p:txBody>
+      </p:sp>
+    </p:spTree>
+  </p:cSld>
+  <p:clrMapOvr>
+    <a:masterClrMapping/>
+  </p:clrMapOvr>
+</p:sld>
+</file>
+
+<file path=ppt/slides/slide27.xml><?xml version="1.0" encoding="utf-8"?>
+<p:sld xmlns:a="http://schemas.openxmlformats.org/drawingml/2006/main" xmlns:r="http://schemas.openxmlformats.org/officeDocument/2006/relationships" xmlns:p="http://schemas.openxmlformats.org/presentationml/2006/main">
+  <p:cSld>
+    <p:spTree>
+      <p:nvGrpSpPr>
+        <p:cNvPr id="1" name=""/>
+        <p:cNvGrpSpPr/>
+        <p:nvPr/>
+      </p:nvGrpSpPr>
+      <p:grpSpPr>
+        <a:xfrm>
+          <a:off x="0" y="0"/>
+          <a:ext cx="0" cy="0"/>
+          <a:chOff x="0" y="0"/>
+          <a:chExt cx="0" cy="0"/>
+        </a:xfrm>
+      </p:grpSpPr>
+      <p:sp>
+        <p:nvSpPr>
+          <p:cNvPr id="2" name="Symbol zastępczy zawartości 1"/>
+          <p:cNvSpPr>
+            <a:spLocks noGrp="1"/>
+          </p:cNvSpPr>
+          <p:nvPr>
+            <p:ph idx="1"/>
+          </p:nvPr>
+        </p:nvSpPr>
+        <p:spPr/>
+        <p:txBody>
+          <a:bodyPr>
+            <a:normAutofit/>
+          </a:bodyPr>
+          <a:lstStyle/>
+          <a:p>
+            <a:r>
+              <a:rPr lang="pl-PL" sz="1200" dirty="0" smtClean="0"/>
+              <a:t>1. Mikrokontrolery STM32 w sieci Ethernet w przykładach - Marcin </a:t>
+            </a:r>
+            <a:r>
+              <a:rPr lang="pl-PL" sz="1200" dirty="0" err="1" smtClean="0"/>
+              <a:t>Peczarski</a:t>
+            </a:r>
+            <a:r>
+              <a:rPr lang="pl-PL" sz="1200" dirty="0" smtClean="0"/>
+              <a:t>, do zakupienia np. tutaj: </a:t>
+            </a:r>
+            <a:br>
+              <a:rPr lang="pl-PL" sz="1200" dirty="0" smtClean="0"/>
+            </a:br>
+            <a:r>
+              <a:rPr lang="pl-PL" sz="1200" dirty="0" smtClean="0">
+                <a:hlinkClick r:id="rId2"/>
+              </a:rPr>
+              <a:t>https://botland.com.pl/ksiazki-i-kursy/3411-mikrokontrolery-stm32-w-sieci-ethernet-w-przykladach-marcin-peczarski-9788360233689.html</a:t>
+            </a:r>
+            <a:r>
+              <a:rPr lang="pl-PL" sz="1200" dirty="0" smtClean="0"/>
+              <a:t> </a:t>
+            </a:r>
+          </a:p>
+          <a:p>
+            <a:pPr>
+              <a:buNone/>
+            </a:pPr>
+            <a:endParaRPr lang="pl-PL" sz="1200" dirty="0" smtClean="0"/>
+          </a:p>
+          <a:p>
+            <a:r>
+              <a:rPr lang="pl-PL" sz="1200" dirty="0" smtClean="0"/>
+              <a:t>2. Lokalne sieci komputerowe, Tomasz </a:t>
+            </a:r>
+            <a:r>
+              <a:rPr lang="pl-PL" sz="1200" dirty="0" err="1" smtClean="0"/>
+              <a:t>Fitzermann</a:t>
+            </a:r>
+            <a:r>
+              <a:rPr lang="pl-PL" sz="1200" dirty="0" smtClean="0"/>
+              <a:t> </a:t>
+            </a:r>
+            <a:br>
+              <a:rPr lang="pl-PL" sz="1200" dirty="0" smtClean="0"/>
+            </a:br>
+            <a:r>
+              <a:rPr lang="pl-PL" sz="1200" dirty="0" smtClean="0">
+                <a:hlinkClick r:id="rId3"/>
+              </a:rPr>
+              <a:t>http://www.sosw.poznan.pl/tfitzer/sieci/sieci.pdf</a:t>
+            </a:r>
+            <a:r>
+              <a:rPr lang="pl-PL" sz="1200" dirty="0" smtClean="0"/>
+              <a:t>  [dostęp 28.01.2023]</a:t>
+            </a:r>
+          </a:p>
+          <a:p>
+            <a:endParaRPr lang="pl-PL" sz="1200" dirty="0" smtClean="0"/>
+          </a:p>
+          <a:p>
+            <a:pPr>
+              <a:buNone/>
+            </a:pPr>
+            <a:endParaRPr lang="pl-PL" sz="1200" dirty="0"/>
+          </a:p>
+        </p:txBody>
+      </p:sp>
+      <p:sp>
+        <p:nvSpPr>
+          <p:cNvPr id="3" name="Tytuł 2"/>
+          <p:cNvSpPr>
+            <a:spLocks noGrp="1"/>
+          </p:cNvSpPr>
+          <p:nvPr>
+            <p:ph type="title"/>
+          </p:nvPr>
+        </p:nvSpPr>
+        <p:spPr/>
+        <p:txBody>
+          <a:bodyPr>
+            <a:normAutofit/>
+          </a:bodyPr>
+          <a:lstStyle/>
+          <a:p>
+            <a:r>
+              <a:rPr lang="pl-PL" dirty="0" smtClean="0"/>
+              <a:t>Polecana literatura:		</a:t>
             </a:r>
             <a:endParaRPr lang="pl-PL" dirty="0"/>
           </a:p>
@@ -11863,23 +12276,7 @@
           <a:p>
             <a:r>
               <a:rPr lang="pl-PL" dirty="0" smtClean="0"/>
-              <a:t>Założenie: </a:t>
-            </a:r>
-            <a:r>
-              <a:rPr lang="pl-PL" dirty="0" smtClean="0"/>
-              <a:t>PC1</a:t>
-            </a:r>
-            <a:r>
-              <a:rPr lang="pl-PL" dirty="0" smtClean="0"/>
-              <a:t> </a:t>
-            </a:r>
-            <a:r>
-              <a:rPr lang="pl-PL" dirty="0" smtClean="0"/>
-              <a:t>wysyła dane do </a:t>
-            </a:r>
-            <a:r>
-              <a:rPr lang="pl-PL" dirty="0" smtClean="0"/>
-              <a:t>Drukarki</a:t>
+              <a:t>Założenie: PC1 wysyła dane do Drukarki</a:t>
             </a:r>
             <a:endParaRPr lang="pl-PL" dirty="0"/>
           </a:p>

</xml_diff>